<commit_message>
hours set to< 40; charts are good to go.
</commit_message>
<xml_diff>
--- a/Presentation.pptx
+++ b/Presentation.pptx
@@ -4101,7 +4101,7 @@
           <a:p>
             <a:fld id="{B56F32FC-4BD9-442A-A8C6-51598C909FE3}" type="datetimeFigureOut">
               <a:rPr lang="en-US" smtClean="0"/>
-              <a:t>2/11/23</a:t>
+              <a:t>2/12/23</a:t>
             </a:fld>
             <a:endParaRPr lang="en-US" dirty="0"/>
           </a:p>
@@ -4278,7 +4278,7 @@
           <a:p>
             <a:fld id="{056371FA-A98D-41E8-93F4-09945841298A}" type="datetimeFigureOut">
               <a:rPr lang="en-US" smtClean="0"/>
-              <a:t>2/11/23</a:t>
+              <a:t>2/12/23</a:t>
             </a:fld>
             <a:endParaRPr lang="en-US" dirty="0"/>
           </a:p>
@@ -4762,6 +4762,20 @@
               <a:t>I really want to highlight Candida solved our looping list for multiple pages of data; I am not sure other would have to have done that. </a:t>
             </a:r>
           </a:p>
+          <a:p>
+            <a:endParaRPr lang="en-US" dirty="0"/>
+          </a:p>
+          <a:p>
+            <a:r>
+              <a:rPr lang="en-US" dirty="0"/>
+              <a:t>We had over 800K+ lines of data to pull through; we selected 100 pages </a:t>
+            </a:r>
+            <a:r>
+              <a:rPr lang="en-US"/>
+              <a:t>resulting in 2000 games</a:t>
+            </a:r>
+            <a:endParaRPr lang="en-US" dirty="0"/>
+          </a:p>
         </p:txBody>
       </p:sp>
       <p:sp>
@@ -4844,37 +4858,7 @@
           <a:bodyPr/>
           <a:lstStyle/>
           <a:p>
-            <a:r>
-              <a:rPr lang="en-US" dirty="0"/>
-              <a:t>We are not adding images just yet until we decide on how many data points we really want to look at. </a:t>
-            </a:r>
-          </a:p>
-          <a:p>
             <a:endParaRPr lang="en-US" dirty="0"/>
-          </a:p>
-          <a:p>
-            <a:r>
-              <a:rPr lang="en-US" dirty="0"/>
-              <a:t>Rachel = 2500</a:t>
-            </a:r>
-          </a:p>
-          <a:p>
-            <a:r>
-              <a:rPr lang="en-US" dirty="0"/>
-              <a:t>Candida = ?</a:t>
-            </a:r>
-          </a:p>
-          <a:p>
-            <a:r>
-              <a:rPr lang="en-US" dirty="0"/>
-              <a:t>Chris = ?</a:t>
-            </a:r>
-          </a:p>
-          <a:p>
-            <a:r>
-              <a:rPr lang="en-US" dirty="0"/>
-              <a:t>Max = ?</a:t>
-            </a:r>
           </a:p>
         </p:txBody>
       </p:sp>
@@ -18420,34 +18404,6 @@
 </file>
 
 <file path=customXml/item1.xml><?xml version="1.0" encoding="utf-8"?>
-<p:properties xmlns:p="http://schemas.microsoft.com/office/2006/metadata/properties" xmlns:xsi="http://www.w3.org/2001/XMLSchema-instance" xmlns:pc="http://schemas.microsoft.com/office/infopath/2007/PartnerControls">
-  <documentManagement>
-    <_ip_UnifiedCompliancePolicyUIAction xmlns="http://schemas.microsoft.com/sharepoint/v3" xsi:nil="true"/>
-    <Image xmlns="71af3243-3dd4-4a8d-8c0d-dd76da1f02a5">
-      <Url xsi:nil="true"/>
-      <Description xsi:nil="true"/>
-    </Image>
-    <Status xmlns="71af3243-3dd4-4a8d-8c0d-dd76da1f02a5">Not started</Status>
-    <_ip_UnifiedCompliancePolicyProperties xmlns="http://schemas.microsoft.com/sharepoint/v3" xsi:nil="true"/>
-    <ImageTagsTaxHTField xmlns="71af3243-3dd4-4a8d-8c0d-dd76da1f02a5">
-      <Terms xmlns="http://schemas.microsoft.com/office/infopath/2007/PartnerControls"/>
-    </ImageTagsTaxHTField>
-    <TaxCatchAll xmlns="230e9df3-be65-4c73-a93b-d1236ebd677e"/>
-    <MediaServiceKeyPoints xmlns="71af3243-3dd4-4a8d-8c0d-dd76da1f02a5" xsi:nil="true"/>
-  </documentManagement>
-</p:properties>
-</file>
-
-<file path=customXml/item2.xml><?xml version="1.0" encoding="utf-8"?>
-<?mso-contentType ?>
-<FormTemplates xmlns="http://schemas.microsoft.com/sharepoint/v3/contenttype/forms">
-  <Display>DocumentLibraryForm</Display>
-  <Edit>DocumentLibraryForm</Edit>
-  <New>DocumentLibraryForm</New>
-</FormTemplates>
-</file>
-
-<file path=customXml/item3.xml><?xml version="1.0" encoding="utf-8"?>
 <ct:contentTypeSchema xmlns:ct="http://schemas.microsoft.com/office/2006/metadata/contentType" xmlns:ma="http://schemas.microsoft.com/office/2006/metadata/properties/metaAttributes" ct:_="" ma:_="" ma:contentTypeName="Document" ma:contentTypeID="0x01010079F111ED35F8CC479449609E8A0923A6" ma:contentTypeVersion="20" ma:contentTypeDescription="Create a new document." ma:contentTypeScope="" ma:versionID="1267097ee5f5874adfcc408041ae252e">
   <xsd:schema xmlns:xsd="http://www.w3.org/2001/XMLSchema" xmlns:xs="http://www.w3.org/2001/XMLSchema" xmlns:p="http://schemas.microsoft.com/office/2006/metadata/properties" xmlns:ns1="http://schemas.microsoft.com/sharepoint/v3" xmlns:ns2="71af3243-3dd4-4a8d-8c0d-dd76da1f02a5" xmlns:ns3="16c05727-aa75-4e4a-9b5f-8a80a1165891" xmlns:ns4="230e9df3-be65-4c73-a93b-d1236ebd677e" targetNamespace="http://schemas.microsoft.com/office/2006/metadata/properties" ma:root="true" ma:fieldsID="395891a93df65b14727750f2c06c306c" ns1:_="" ns2:_="" ns3:_="" ns4:_="">
     <xsd:import namespace="http://schemas.microsoft.com/sharepoint/v3"/>
@@ -18723,27 +18679,35 @@
 </ct:contentTypeSchema>
 </file>
 
-<file path=customXml/itemProps1.xml><?xml version="1.0" encoding="utf-8"?>
-<ds:datastoreItem xmlns:ds="http://schemas.openxmlformats.org/officeDocument/2006/customXml" ds:itemID="{4CC7F809-A434-4A8D-A127-1C50C2DB3890}">
-  <ds:schemaRefs>
-    <ds:schemaRef ds:uri="http://schemas.microsoft.com/office/2006/metadata/properties"/>
-    <ds:schemaRef ds:uri="http://schemas.microsoft.com/office/infopath/2007/PartnerControls"/>
-    <ds:schemaRef ds:uri="http://schemas.microsoft.com/sharepoint/v3"/>
-    <ds:schemaRef ds:uri="71af3243-3dd4-4a8d-8c0d-dd76da1f02a5"/>
-    <ds:schemaRef ds:uri="230e9df3-be65-4c73-a93b-d1236ebd677e"/>
-  </ds:schemaRefs>
-</ds:datastoreItem>
+<file path=customXml/item2.xml><?xml version="1.0" encoding="utf-8"?>
+<?mso-contentType ?>
+<FormTemplates xmlns="http://schemas.microsoft.com/sharepoint/v3/contenttype/forms">
+  <Display>DocumentLibraryForm</Display>
+  <Edit>DocumentLibraryForm</Edit>
+  <New>DocumentLibraryForm</New>
+</FormTemplates>
 </file>
 
-<file path=customXml/itemProps2.xml><?xml version="1.0" encoding="utf-8"?>
-<ds:datastoreItem xmlns:ds="http://schemas.openxmlformats.org/officeDocument/2006/customXml" ds:itemID="{BD5826B4-4DD2-4A9B-8D6D-E91CF9C2316C}">
-  <ds:schemaRefs>
-    <ds:schemaRef ds:uri="http://schemas.microsoft.com/sharepoint/v3/contenttype/forms"/>
-  </ds:schemaRefs>
-</ds:datastoreItem>
+<file path=customXml/item3.xml><?xml version="1.0" encoding="utf-8"?>
+<p:properties xmlns:p="http://schemas.microsoft.com/office/2006/metadata/properties" xmlns:xsi="http://www.w3.org/2001/XMLSchema-instance" xmlns:pc="http://schemas.microsoft.com/office/infopath/2007/PartnerControls">
+  <documentManagement>
+    <_ip_UnifiedCompliancePolicyUIAction xmlns="http://schemas.microsoft.com/sharepoint/v3" xsi:nil="true"/>
+    <Image xmlns="71af3243-3dd4-4a8d-8c0d-dd76da1f02a5">
+      <Url xsi:nil="true"/>
+      <Description xsi:nil="true"/>
+    </Image>
+    <Status xmlns="71af3243-3dd4-4a8d-8c0d-dd76da1f02a5">Not started</Status>
+    <_ip_UnifiedCompliancePolicyProperties xmlns="http://schemas.microsoft.com/sharepoint/v3" xsi:nil="true"/>
+    <ImageTagsTaxHTField xmlns="71af3243-3dd4-4a8d-8c0d-dd76da1f02a5">
+      <Terms xmlns="http://schemas.microsoft.com/office/infopath/2007/PartnerControls"/>
+    </ImageTagsTaxHTField>
+    <TaxCatchAll xmlns="230e9df3-be65-4c73-a93b-d1236ebd677e"/>
+    <MediaServiceKeyPoints xmlns="71af3243-3dd4-4a8d-8c0d-dd76da1f02a5" xsi:nil="true"/>
+  </documentManagement>
+</p:properties>
 </file>
 
-<file path=customXml/itemProps3.xml><?xml version="1.0" encoding="utf-8"?>
+<file path=customXml/itemProps1.xml><?xml version="1.0" encoding="utf-8"?>
 <ds:datastoreItem xmlns:ds="http://schemas.openxmlformats.org/officeDocument/2006/customXml" ds:itemID="{4DC6F004-8F9D-4F40-8394-6C4C67F70915}">
   <ds:schemaRefs>
     <ds:schemaRef ds:uri="http://schemas.microsoft.com/office/2006/metadata/contentType"/>
@@ -18764,6 +18728,26 @@
 </ds:datastoreItem>
 </file>
 
+<file path=customXml/itemProps2.xml><?xml version="1.0" encoding="utf-8"?>
+<ds:datastoreItem xmlns:ds="http://schemas.openxmlformats.org/officeDocument/2006/customXml" ds:itemID="{BD5826B4-4DD2-4A9B-8D6D-E91CF9C2316C}">
+  <ds:schemaRefs>
+    <ds:schemaRef ds:uri="http://schemas.microsoft.com/sharepoint/v3/contenttype/forms"/>
+  </ds:schemaRefs>
+</ds:datastoreItem>
+</file>
+
+<file path=customXml/itemProps3.xml><?xml version="1.0" encoding="utf-8"?>
+<ds:datastoreItem xmlns:ds="http://schemas.openxmlformats.org/officeDocument/2006/customXml" ds:itemID="{4CC7F809-A434-4A8D-A127-1C50C2DB3890}">
+  <ds:schemaRefs>
+    <ds:schemaRef ds:uri="http://schemas.microsoft.com/office/2006/metadata/properties"/>
+    <ds:schemaRef ds:uri="http://schemas.microsoft.com/office/infopath/2007/PartnerControls"/>
+    <ds:schemaRef ds:uri="http://schemas.microsoft.com/sharepoint/v3"/>
+    <ds:schemaRef ds:uri="71af3243-3dd4-4a8d-8c0d-dd76da1f02a5"/>
+    <ds:schemaRef ds:uri="230e9df3-be65-4c73-a93b-d1236ebd677e"/>
+  </ds:schemaRefs>
+</ds:datastoreItem>
+</file>
+
 <file path=docMetadata/LabelInfo.xml><?xml version="1.0" encoding="utf-8"?>
 <clbl:labelList xmlns:clbl="http://schemas.microsoft.com/office/2020/mipLabelMetadata">
   <clbl:label id="{f42aa342-8706-4288-bd11-ebb85995028c}" enabled="1" method="Standard" siteId="{72f988bf-86f1-41af-91ab-2d7cd011db47}" removed="0"/>

</xml_diff>